<commit_message>
updates to prepare for class
</commit_message>
<xml_diff>
--- a/Lesson_2/conditional_independence_diagrams.pptx
+++ b/Lesson_2/conditional_independence_diagrams.pptx
@@ -17,6 +17,7 @@
     <p:sldId id="269" r:id="rId11"/>
     <p:sldId id="268" r:id="rId12"/>
     <p:sldId id="258" r:id="rId13"/>
+    <p:sldId id="270" r:id="rId14"/>
   </p:sldIdLst>
   <p:sldSz cx="12192000" cy="6858000"/>
   <p:notesSz cx="6858000" cy="9144000"/>
@@ -5249,6 +5250,802 @@
 </p:sld>
 </file>
 
+<file path=ppt/slides/slide13.xml><?xml version="1.0" encoding="utf-8"?>
+<p:sld xmlns:a="http://schemas.openxmlformats.org/drawingml/2006/main" xmlns:r="http://schemas.openxmlformats.org/officeDocument/2006/relationships" xmlns:p="http://schemas.openxmlformats.org/presentationml/2006/main">
+  <p:cSld>
+    <p:spTree>
+      <p:nvGrpSpPr>
+        <p:cNvPr id="1" name=""/>
+        <p:cNvGrpSpPr/>
+        <p:nvPr/>
+      </p:nvGrpSpPr>
+      <p:grpSpPr>
+        <a:xfrm>
+          <a:off x="0" y="0"/>
+          <a:ext cx="0" cy="0"/>
+          <a:chOff x="0" y="0"/>
+          <a:chExt cx="0" cy="0"/>
+        </a:xfrm>
+      </p:grpSpPr>
+      <p:sp>
+        <p:nvSpPr>
+          <p:cNvPr id="10" name="Parallelogram 9">
+            <a:extLst>
+              <a:ext uri="{FF2B5EF4-FFF2-40B4-BE49-F238E27FC236}">
+                <a16:creationId xmlns:a16="http://schemas.microsoft.com/office/drawing/2014/main" id="{A5488F34-AA2E-334D-9786-80B77A19F3E1}"/>
+              </a:ext>
+            </a:extLst>
+          </p:cNvPr>
+          <p:cNvSpPr/>
+          <p:nvPr/>
+        </p:nvSpPr>
+        <p:spPr>
+          <a:xfrm rot="577662" flipH="1">
+            <a:off x="3970383" y="2958225"/>
+            <a:ext cx="4251233" cy="1565133"/>
+          </a:xfrm>
+          <a:prstGeom prst="parallelogram">
+            <a:avLst>
+              <a:gd name="adj" fmla="val 18269"/>
+            </a:avLst>
+          </a:prstGeom>
+          <a:solidFill>
+            <a:schemeClr val="accent4">
+              <a:lumMod val="20000"/>
+              <a:lumOff val="80000"/>
+            </a:schemeClr>
+          </a:solidFill>
+          <a:ln>
+            <a:noFill/>
+          </a:ln>
+        </p:spPr>
+        <p:style>
+          <a:lnRef idx="2">
+            <a:schemeClr val="accent1">
+              <a:shade val="50000"/>
+            </a:schemeClr>
+          </a:lnRef>
+          <a:fillRef idx="1">
+            <a:schemeClr val="accent1"/>
+          </a:fillRef>
+          <a:effectRef idx="0">
+            <a:schemeClr val="accent1"/>
+          </a:effectRef>
+          <a:fontRef idx="minor">
+            <a:schemeClr val="lt1"/>
+          </a:fontRef>
+        </p:style>
+        <p:txBody>
+          <a:bodyPr rtlCol="0" anchor="ctr"/>
+          <a:lstStyle/>
+          <a:p>
+            <a:pPr algn="ctr"/>
+            <a:endParaRPr lang="en-US"/>
+          </a:p>
+        </p:txBody>
+      </p:sp>
+      <p:sp>
+        <p:nvSpPr>
+          <p:cNvPr id="2" name="Rectangle 1">
+            <a:extLst>
+              <a:ext uri="{FF2B5EF4-FFF2-40B4-BE49-F238E27FC236}">
+                <a16:creationId xmlns:a16="http://schemas.microsoft.com/office/drawing/2014/main" id="{CE963652-FF00-9343-8251-A3CC1ECD7A54}"/>
+              </a:ext>
+            </a:extLst>
+          </p:cNvPr>
+          <p:cNvSpPr/>
+          <p:nvPr/>
+        </p:nvSpPr>
+        <p:spPr>
+          <a:xfrm>
+            <a:off x="2358081" y="1390135"/>
+            <a:ext cx="7475838" cy="4077730"/>
+          </a:xfrm>
+          <a:prstGeom prst="rect">
+            <a:avLst/>
+          </a:prstGeom>
+          <a:noFill/>
+          <a:ln w="38100">
+            <a:solidFill>
+              <a:schemeClr val="tx1"/>
+            </a:solidFill>
+          </a:ln>
+        </p:spPr>
+        <p:style>
+          <a:lnRef idx="2">
+            <a:schemeClr val="accent1">
+              <a:shade val="50000"/>
+            </a:schemeClr>
+          </a:lnRef>
+          <a:fillRef idx="1">
+            <a:schemeClr val="accent1"/>
+          </a:fillRef>
+          <a:effectRef idx="0">
+            <a:schemeClr val="accent1"/>
+          </a:effectRef>
+          <a:fontRef idx="minor">
+            <a:schemeClr val="lt1"/>
+          </a:fontRef>
+        </p:style>
+        <p:txBody>
+          <a:bodyPr rtlCol="0" anchor="ctr"/>
+          <a:lstStyle/>
+          <a:p>
+            <a:pPr algn="ctr"/>
+            <a:endParaRPr lang="en-US"/>
+          </a:p>
+        </p:txBody>
+      </p:sp>
+      <p:cxnSp>
+        <p:nvCxnSpPr>
+          <p:cNvPr id="4" name="Straight Connector 3">
+            <a:extLst>
+              <a:ext uri="{FF2B5EF4-FFF2-40B4-BE49-F238E27FC236}">
+                <a16:creationId xmlns:a16="http://schemas.microsoft.com/office/drawing/2014/main" id="{B6CE3539-E10D-D34F-8B15-7622A7E5DA13}"/>
+              </a:ext>
+            </a:extLst>
+          </p:cNvPr>
+          <p:cNvCxnSpPr/>
+          <p:nvPr/>
+        </p:nvCxnSpPr>
+        <p:spPr>
+          <a:xfrm>
+            <a:off x="4942703" y="1390135"/>
+            <a:ext cx="0" cy="4077730"/>
+          </a:xfrm>
+          <a:prstGeom prst="line">
+            <a:avLst/>
+          </a:prstGeom>
+          <a:ln w="28575">
+            <a:solidFill>
+              <a:schemeClr val="accent1">
+                <a:lumMod val="75000"/>
+              </a:schemeClr>
+            </a:solidFill>
+          </a:ln>
+        </p:spPr>
+        <p:style>
+          <a:lnRef idx="1">
+            <a:schemeClr val="accent1"/>
+          </a:lnRef>
+          <a:fillRef idx="0">
+            <a:schemeClr val="accent1"/>
+          </a:fillRef>
+          <a:effectRef idx="0">
+            <a:schemeClr val="accent1"/>
+          </a:effectRef>
+          <a:fontRef idx="minor">
+            <a:schemeClr val="tx1"/>
+          </a:fontRef>
+        </p:style>
+      </p:cxnSp>
+      <p:cxnSp>
+        <p:nvCxnSpPr>
+          <p:cNvPr id="9" name="Straight Connector 8">
+            <a:extLst>
+              <a:ext uri="{FF2B5EF4-FFF2-40B4-BE49-F238E27FC236}">
+                <a16:creationId xmlns:a16="http://schemas.microsoft.com/office/drawing/2014/main" id="{B7AACF4E-C40D-CF44-9017-713388957CF7}"/>
+              </a:ext>
+            </a:extLst>
+          </p:cNvPr>
+          <p:cNvCxnSpPr/>
+          <p:nvPr/>
+        </p:nvCxnSpPr>
+        <p:spPr>
+          <a:xfrm>
+            <a:off x="2358081" y="2850776"/>
+            <a:ext cx="7475838" cy="1264024"/>
+          </a:xfrm>
+          <a:prstGeom prst="line">
+            <a:avLst/>
+          </a:prstGeom>
+          <a:ln w="28575">
+            <a:solidFill>
+              <a:srgbClr val="C00000"/>
+            </a:solidFill>
+          </a:ln>
+        </p:spPr>
+        <p:style>
+          <a:lnRef idx="1">
+            <a:schemeClr val="accent1"/>
+          </a:lnRef>
+          <a:fillRef idx="0">
+            <a:schemeClr val="accent1"/>
+          </a:fillRef>
+          <a:effectRef idx="0">
+            <a:schemeClr val="accent1"/>
+          </a:effectRef>
+          <a:fontRef idx="minor">
+            <a:schemeClr val="tx1"/>
+          </a:fontRef>
+        </p:style>
+      </p:cxnSp>
+      <p:sp>
+        <p:nvSpPr>
+          <p:cNvPr id="13" name="TextBox 12">
+            <a:extLst>
+              <a:ext uri="{FF2B5EF4-FFF2-40B4-BE49-F238E27FC236}">
+                <a16:creationId xmlns:a16="http://schemas.microsoft.com/office/drawing/2014/main" id="{DEA0AAD0-B27D-864E-A258-632D2D759AD8}"/>
+              </a:ext>
+            </a:extLst>
+          </p:cNvPr>
+          <p:cNvSpPr txBox="1"/>
+          <p:nvPr/>
+        </p:nvSpPr>
+        <p:spPr>
+          <a:xfrm>
+            <a:off x="5428324" y="2877220"/>
+            <a:ext cx="567015" cy="400110"/>
+          </a:xfrm>
+          <a:prstGeom prst="rect">
+            <a:avLst/>
+          </a:prstGeom>
+          <a:noFill/>
+        </p:spPr>
+        <p:txBody>
+          <a:bodyPr wrap="square" rtlCol="0">
+            <a:spAutoFit/>
+          </a:bodyPr>
+          <a:lstStyle/>
+          <a:p>
+            <a:r>
+              <a:rPr lang="en-US" sz="2000" b="1" i="1" dirty="0">
+                <a:latin typeface="Cambria Math" panose="02040503050406030204" pitchFamily="18" charset="0"/>
+                <a:ea typeface="Cambria Math" panose="02040503050406030204" pitchFamily="18" charset="0"/>
+              </a:rPr>
+              <a:t>D</a:t>
+            </a:r>
+          </a:p>
+        </p:txBody>
+      </p:sp>
+      <p:sp>
+        <p:nvSpPr>
+          <p:cNvPr id="15" name="TextBox 14">
+            <a:extLst>
+              <a:ext uri="{FF2B5EF4-FFF2-40B4-BE49-F238E27FC236}">
+                <a16:creationId xmlns:a16="http://schemas.microsoft.com/office/drawing/2014/main" id="{A6E9EFDD-D15B-A044-A7AB-CD6847422374}"/>
+              </a:ext>
+            </a:extLst>
+          </p:cNvPr>
+          <p:cNvSpPr txBox="1"/>
+          <p:nvPr/>
+        </p:nvSpPr>
+        <p:spPr>
+          <a:xfrm>
+            <a:off x="9118134" y="1620067"/>
+            <a:ext cx="567015" cy="400110"/>
+          </a:xfrm>
+          <a:prstGeom prst="rect">
+            <a:avLst/>
+          </a:prstGeom>
+          <a:noFill/>
+        </p:spPr>
+        <p:txBody>
+          <a:bodyPr wrap="square" rtlCol="0">
+            <a:spAutoFit/>
+          </a:bodyPr>
+          <a:lstStyle/>
+          <a:p>
+            <a:r>
+              <a:rPr lang="en-US" sz="2000" i="1" dirty="0">
+                <a:solidFill>
+                  <a:schemeClr val="accent1">
+                    <a:lumMod val="75000"/>
+                  </a:schemeClr>
+                </a:solidFill>
+                <a:latin typeface="Cambria Math" panose="02040503050406030204" pitchFamily="18" charset="0"/>
+                <a:ea typeface="Cambria Math" panose="02040503050406030204" pitchFamily="18" charset="0"/>
+              </a:rPr>
+              <a:t>T</a:t>
+            </a:r>
+            <a:r>
+              <a:rPr lang="en-US" sz="2000" i="1" baseline="-25000" dirty="0">
+                <a:solidFill>
+                  <a:schemeClr val="accent1">
+                    <a:lumMod val="75000"/>
+                  </a:schemeClr>
+                </a:solidFill>
+                <a:latin typeface="Cambria Math" panose="02040503050406030204" pitchFamily="18" charset="0"/>
+                <a:ea typeface="Cambria Math" panose="02040503050406030204" pitchFamily="18" charset="0"/>
+              </a:rPr>
+              <a:t>1</a:t>
+            </a:r>
+            <a:endParaRPr lang="en-US" sz="2000" i="1" dirty="0">
+              <a:solidFill>
+                <a:schemeClr val="accent1">
+                  <a:lumMod val="75000"/>
+                </a:schemeClr>
+              </a:solidFill>
+              <a:latin typeface="Cambria Math" panose="02040503050406030204" pitchFamily="18" charset="0"/>
+              <a:ea typeface="Cambria Math" panose="02040503050406030204" pitchFamily="18" charset="0"/>
+            </a:endParaRPr>
+          </a:p>
+        </p:txBody>
+      </p:sp>
+      <p:sp>
+        <p:nvSpPr>
+          <p:cNvPr id="16" name="TextBox 15">
+            <a:extLst>
+              <a:ext uri="{FF2B5EF4-FFF2-40B4-BE49-F238E27FC236}">
+                <a16:creationId xmlns:a16="http://schemas.microsoft.com/office/drawing/2014/main" id="{E671C208-9AF0-3E4A-906E-08830693BDF0}"/>
+              </a:ext>
+            </a:extLst>
+          </p:cNvPr>
+          <p:cNvSpPr txBox="1"/>
+          <p:nvPr/>
+        </p:nvSpPr>
+        <p:spPr>
+          <a:xfrm>
+            <a:off x="2579594" y="1620067"/>
+            <a:ext cx="567015" cy="400110"/>
+          </a:xfrm>
+          <a:prstGeom prst="rect">
+            <a:avLst/>
+          </a:prstGeom>
+          <a:noFill/>
+        </p:spPr>
+        <p:txBody>
+          <a:bodyPr wrap="square" rtlCol="0">
+            <a:spAutoFit/>
+          </a:bodyPr>
+          <a:lstStyle/>
+          <a:p>
+            <a:r>
+              <a:rPr lang="en-US" sz="2000" i="1" dirty="0">
+                <a:solidFill>
+                  <a:schemeClr val="accent1">
+                    <a:lumMod val="75000"/>
+                  </a:schemeClr>
+                </a:solidFill>
+                <a:latin typeface="Cambria Math" panose="02040503050406030204" pitchFamily="18" charset="0"/>
+                <a:ea typeface="Cambria Math" panose="02040503050406030204" pitchFamily="18" charset="0"/>
+              </a:rPr>
+              <a:t>T</a:t>
+            </a:r>
+            <a:r>
+              <a:rPr lang="en-US" sz="2000" i="1" baseline="-25000" dirty="0">
+                <a:solidFill>
+                  <a:schemeClr val="accent1">
+                    <a:lumMod val="75000"/>
+                  </a:schemeClr>
+                </a:solidFill>
+                <a:latin typeface="Cambria Math" panose="02040503050406030204" pitchFamily="18" charset="0"/>
+                <a:ea typeface="Cambria Math" panose="02040503050406030204" pitchFamily="18" charset="0"/>
+              </a:rPr>
+              <a:t>1</a:t>
+            </a:r>
+            <a:r>
+              <a:rPr lang="en-US" sz="2000" i="1" baseline="30000" dirty="0">
+                <a:solidFill>
+                  <a:schemeClr val="accent1">
+                    <a:lumMod val="75000"/>
+                  </a:schemeClr>
+                </a:solidFill>
+                <a:latin typeface="Cambria Math" panose="02040503050406030204" pitchFamily="18" charset="0"/>
+                <a:ea typeface="Cambria Math" panose="02040503050406030204" pitchFamily="18" charset="0"/>
+              </a:rPr>
+              <a:t>c</a:t>
+            </a:r>
+            <a:endParaRPr lang="en-US" sz="2000" i="1" dirty="0">
+              <a:solidFill>
+                <a:schemeClr val="accent1">
+                  <a:lumMod val="75000"/>
+                </a:schemeClr>
+              </a:solidFill>
+              <a:latin typeface="Cambria Math" panose="02040503050406030204" pitchFamily="18" charset="0"/>
+              <a:ea typeface="Cambria Math" panose="02040503050406030204" pitchFamily="18" charset="0"/>
+            </a:endParaRPr>
+          </a:p>
+        </p:txBody>
+      </p:sp>
+      <p:sp>
+        <p:nvSpPr>
+          <p:cNvPr id="17" name="TextBox 16">
+            <a:extLst>
+              <a:ext uri="{FF2B5EF4-FFF2-40B4-BE49-F238E27FC236}">
+                <a16:creationId xmlns:a16="http://schemas.microsoft.com/office/drawing/2014/main" id="{509C89D1-C449-944A-BB9B-835ABBC61A1F}"/>
+              </a:ext>
+            </a:extLst>
+          </p:cNvPr>
+          <p:cNvSpPr txBox="1"/>
+          <p:nvPr/>
+        </p:nvSpPr>
+        <p:spPr>
+          <a:xfrm>
+            <a:off x="9118134" y="3371459"/>
+            <a:ext cx="567015" cy="400110"/>
+          </a:xfrm>
+          <a:prstGeom prst="rect">
+            <a:avLst/>
+          </a:prstGeom>
+          <a:noFill/>
+        </p:spPr>
+        <p:txBody>
+          <a:bodyPr wrap="square" rtlCol="0">
+            <a:spAutoFit/>
+          </a:bodyPr>
+          <a:lstStyle/>
+          <a:p>
+            <a:r>
+              <a:rPr lang="en-US" sz="2000" i="1" dirty="0">
+                <a:solidFill>
+                  <a:srgbClr val="C00000"/>
+                </a:solidFill>
+                <a:latin typeface="Cambria Math" panose="02040503050406030204" pitchFamily="18" charset="0"/>
+                <a:ea typeface="Cambria Math" panose="02040503050406030204" pitchFamily="18" charset="0"/>
+              </a:rPr>
+              <a:t>T</a:t>
+            </a:r>
+            <a:r>
+              <a:rPr lang="en-US" sz="2000" i="1" baseline="-25000" dirty="0">
+                <a:solidFill>
+                  <a:srgbClr val="C00000"/>
+                </a:solidFill>
+                <a:latin typeface="Cambria Math" panose="02040503050406030204" pitchFamily="18" charset="0"/>
+                <a:ea typeface="Cambria Math" panose="02040503050406030204" pitchFamily="18" charset="0"/>
+              </a:rPr>
+              <a:t>2</a:t>
+            </a:r>
+            <a:endParaRPr lang="en-US" sz="2000" i="1" dirty="0">
+              <a:solidFill>
+                <a:srgbClr val="C00000"/>
+              </a:solidFill>
+              <a:latin typeface="Cambria Math" panose="02040503050406030204" pitchFamily="18" charset="0"/>
+              <a:ea typeface="Cambria Math" panose="02040503050406030204" pitchFamily="18" charset="0"/>
+            </a:endParaRPr>
+          </a:p>
+        </p:txBody>
+      </p:sp>
+      <p:sp>
+        <p:nvSpPr>
+          <p:cNvPr id="18" name="TextBox 17">
+            <a:extLst>
+              <a:ext uri="{FF2B5EF4-FFF2-40B4-BE49-F238E27FC236}">
+                <a16:creationId xmlns:a16="http://schemas.microsoft.com/office/drawing/2014/main" id="{F60077D4-B99A-994E-BC8F-02EE3CC604AE}"/>
+              </a:ext>
+            </a:extLst>
+          </p:cNvPr>
+          <p:cNvSpPr txBox="1"/>
+          <p:nvPr/>
+        </p:nvSpPr>
+        <p:spPr>
+          <a:xfrm>
+            <a:off x="9118134" y="4306652"/>
+            <a:ext cx="567015" cy="400110"/>
+          </a:xfrm>
+          <a:prstGeom prst="rect">
+            <a:avLst/>
+          </a:prstGeom>
+          <a:noFill/>
+        </p:spPr>
+        <p:txBody>
+          <a:bodyPr wrap="square" rtlCol="0">
+            <a:spAutoFit/>
+          </a:bodyPr>
+          <a:lstStyle/>
+          <a:p>
+            <a:r>
+              <a:rPr lang="en-US" sz="2000" i="1" dirty="0">
+                <a:solidFill>
+                  <a:srgbClr val="C00000"/>
+                </a:solidFill>
+                <a:latin typeface="Cambria Math" panose="02040503050406030204" pitchFamily="18" charset="0"/>
+                <a:ea typeface="Cambria Math" panose="02040503050406030204" pitchFamily="18" charset="0"/>
+              </a:rPr>
+              <a:t>T</a:t>
+            </a:r>
+            <a:r>
+              <a:rPr lang="en-US" sz="2000" i="1" baseline="-25000" dirty="0">
+                <a:solidFill>
+                  <a:srgbClr val="C00000"/>
+                </a:solidFill>
+                <a:latin typeface="Cambria Math" panose="02040503050406030204" pitchFamily="18" charset="0"/>
+                <a:ea typeface="Cambria Math" panose="02040503050406030204" pitchFamily="18" charset="0"/>
+              </a:rPr>
+              <a:t>2</a:t>
+            </a:r>
+            <a:r>
+              <a:rPr lang="en-US" sz="2000" i="1" baseline="30000" dirty="0">
+                <a:solidFill>
+                  <a:srgbClr val="C00000"/>
+                </a:solidFill>
+                <a:latin typeface="Cambria Math" panose="02040503050406030204" pitchFamily="18" charset="0"/>
+                <a:ea typeface="Cambria Math" panose="02040503050406030204" pitchFamily="18" charset="0"/>
+              </a:rPr>
+              <a:t>c</a:t>
+            </a:r>
+            <a:endParaRPr lang="en-US" sz="2000" i="1" dirty="0">
+              <a:solidFill>
+                <a:srgbClr val="C00000"/>
+              </a:solidFill>
+              <a:latin typeface="Cambria Math" panose="02040503050406030204" pitchFamily="18" charset="0"/>
+              <a:ea typeface="Cambria Math" panose="02040503050406030204" pitchFamily="18" charset="0"/>
+            </a:endParaRPr>
+          </a:p>
+        </p:txBody>
+      </p:sp>
+      <p:cxnSp>
+        <p:nvCxnSpPr>
+          <p:cNvPr id="5" name="Straight Connector 4">
+            <a:extLst>
+              <a:ext uri="{FF2B5EF4-FFF2-40B4-BE49-F238E27FC236}">
+                <a16:creationId xmlns:a16="http://schemas.microsoft.com/office/drawing/2014/main" id="{A0756C66-3668-8A4F-A745-999E2BA7C46B}"/>
+              </a:ext>
+            </a:extLst>
+          </p:cNvPr>
+          <p:cNvCxnSpPr>
+            <a:cxnSpLocks/>
+          </p:cNvCxnSpPr>
+          <p:nvPr/>
+        </p:nvCxnSpPr>
+        <p:spPr>
+          <a:xfrm>
+            <a:off x="2308653" y="2730843"/>
+            <a:ext cx="0" cy="2798807"/>
+          </a:xfrm>
+          <a:prstGeom prst="line">
+            <a:avLst/>
+          </a:prstGeom>
+          <a:ln w="76200">
+            <a:solidFill>
+              <a:schemeClr val="accent6"/>
+            </a:solidFill>
+          </a:ln>
+        </p:spPr>
+        <p:style>
+          <a:lnRef idx="1">
+            <a:schemeClr val="accent1"/>
+          </a:lnRef>
+          <a:fillRef idx="0">
+            <a:schemeClr val="accent1"/>
+          </a:fillRef>
+          <a:effectRef idx="0">
+            <a:schemeClr val="accent1"/>
+          </a:effectRef>
+          <a:fontRef idx="minor">
+            <a:schemeClr val="tx1"/>
+          </a:fontRef>
+        </p:style>
+      </p:cxnSp>
+      <p:cxnSp>
+        <p:nvCxnSpPr>
+          <p:cNvPr id="19" name="Straight Connector 18">
+            <a:extLst>
+              <a:ext uri="{FF2B5EF4-FFF2-40B4-BE49-F238E27FC236}">
+                <a16:creationId xmlns:a16="http://schemas.microsoft.com/office/drawing/2014/main" id="{AEAF2323-53A2-424B-9201-14033B12CD9A}"/>
+              </a:ext>
+            </a:extLst>
+          </p:cNvPr>
+          <p:cNvCxnSpPr>
+            <a:cxnSpLocks/>
+          </p:cNvCxnSpPr>
+          <p:nvPr/>
+        </p:nvCxnSpPr>
+        <p:spPr>
+          <a:xfrm flipH="1">
+            <a:off x="2287215" y="5536041"/>
+            <a:ext cx="2741985" cy="0"/>
+          </a:xfrm>
+          <a:prstGeom prst="line">
+            <a:avLst/>
+          </a:prstGeom>
+          <a:ln w="76200">
+            <a:solidFill>
+              <a:schemeClr val="accent6"/>
+            </a:solidFill>
+          </a:ln>
+        </p:spPr>
+        <p:style>
+          <a:lnRef idx="1">
+            <a:schemeClr val="accent1"/>
+          </a:lnRef>
+          <a:fillRef idx="0">
+            <a:schemeClr val="accent1"/>
+          </a:fillRef>
+          <a:effectRef idx="0">
+            <a:schemeClr val="accent1"/>
+          </a:effectRef>
+          <a:fontRef idx="minor">
+            <a:schemeClr val="tx1"/>
+          </a:fontRef>
+        </p:style>
+      </p:cxnSp>
+      <p:cxnSp>
+        <p:nvCxnSpPr>
+          <p:cNvPr id="20" name="Straight Connector 19">
+            <a:extLst>
+              <a:ext uri="{FF2B5EF4-FFF2-40B4-BE49-F238E27FC236}">
+                <a16:creationId xmlns:a16="http://schemas.microsoft.com/office/drawing/2014/main" id="{59DF020E-7A5A-B747-A155-A0EFCE515ECE}"/>
+              </a:ext>
+            </a:extLst>
+          </p:cNvPr>
+          <p:cNvCxnSpPr>
+            <a:cxnSpLocks/>
+          </p:cNvCxnSpPr>
+          <p:nvPr/>
+        </p:nvCxnSpPr>
+        <p:spPr>
+          <a:xfrm>
+            <a:off x="4992129" y="3166162"/>
+            <a:ext cx="0" cy="2351131"/>
+          </a:xfrm>
+          <a:prstGeom prst="line">
+            <a:avLst/>
+          </a:prstGeom>
+          <a:ln w="76200">
+            <a:solidFill>
+              <a:schemeClr val="accent6"/>
+            </a:solidFill>
+          </a:ln>
+        </p:spPr>
+        <p:style>
+          <a:lnRef idx="1">
+            <a:schemeClr val="accent1"/>
+          </a:lnRef>
+          <a:fillRef idx="0">
+            <a:schemeClr val="accent1"/>
+          </a:fillRef>
+          <a:effectRef idx="0">
+            <a:schemeClr val="accent1"/>
+          </a:effectRef>
+          <a:fontRef idx="minor">
+            <a:schemeClr val="tx1"/>
+          </a:fontRef>
+        </p:style>
+      </p:cxnSp>
+      <p:cxnSp>
+        <p:nvCxnSpPr>
+          <p:cNvPr id="23" name="Straight Connector 22">
+            <a:extLst>
+              <a:ext uri="{FF2B5EF4-FFF2-40B4-BE49-F238E27FC236}">
+                <a16:creationId xmlns:a16="http://schemas.microsoft.com/office/drawing/2014/main" id="{2A814FA1-F814-1642-A945-1601AF6F3887}"/>
+              </a:ext>
+            </a:extLst>
+          </p:cNvPr>
+          <p:cNvCxnSpPr>
+            <a:cxnSpLocks/>
+          </p:cNvCxnSpPr>
+          <p:nvPr/>
+        </p:nvCxnSpPr>
+        <p:spPr>
+          <a:xfrm flipH="1" flipV="1">
+            <a:off x="2358081" y="2804985"/>
+            <a:ext cx="2584623" cy="435319"/>
+          </a:xfrm>
+          <a:prstGeom prst="line">
+            <a:avLst/>
+          </a:prstGeom>
+          <a:ln w="76200">
+            <a:solidFill>
+              <a:schemeClr val="accent6"/>
+            </a:solidFill>
+          </a:ln>
+        </p:spPr>
+        <p:style>
+          <a:lnRef idx="1">
+            <a:schemeClr val="accent1"/>
+          </a:lnRef>
+          <a:fillRef idx="0">
+            <a:schemeClr val="accent1"/>
+          </a:fillRef>
+          <a:effectRef idx="0">
+            <a:schemeClr val="accent1"/>
+          </a:effectRef>
+          <a:fontRef idx="minor">
+            <a:schemeClr val="tx1"/>
+          </a:fontRef>
+        </p:style>
+      </p:cxnSp>
+      <p:cxnSp>
+        <p:nvCxnSpPr>
+          <p:cNvPr id="27" name="Straight Connector 26">
+            <a:extLst>
+              <a:ext uri="{FF2B5EF4-FFF2-40B4-BE49-F238E27FC236}">
+                <a16:creationId xmlns:a16="http://schemas.microsoft.com/office/drawing/2014/main" id="{70343696-E872-D849-A882-32D9F26F1E64}"/>
+              </a:ext>
+            </a:extLst>
+          </p:cNvPr>
+          <p:cNvCxnSpPr>
+            <a:cxnSpLocks/>
+          </p:cNvCxnSpPr>
+          <p:nvPr/>
+        </p:nvCxnSpPr>
+        <p:spPr>
+          <a:xfrm flipH="1" flipV="1">
+            <a:off x="2278806" y="2756651"/>
+            <a:ext cx="2713323" cy="483653"/>
+          </a:xfrm>
+          <a:prstGeom prst="line">
+            <a:avLst/>
+          </a:prstGeom>
+          <a:ln w="76200">
+            <a:solidFill>
+              <a:schemeClr val="accent6"/>
+            </a:solidFill>
+          </a:ln>
+        </p:spPr>
+        <p:style>
+          <a:lnRef idx="1">
+            <a:schemeClr val="accent1"/>
+          </a:lnRef>
+          <a:fillRef idx="0">
+            <a:schemeClr val="accent1"/>
+          </a:fillRef>
+          <a:effectRef idx="0">
+            <a:schemeClr val="accent1"/>
+          </a:effectRef>
+          <a:fontRef idx="minor">
+            <a:schemeClr val="tx1"/>
+          </a:fontRef>
+        </p:style>
+      </p:cxnSp>
+      <p:sp>
+        <p:nvSpPr>
+          <p:cNvPr id="14" name="Parallelogram 13">
+            <a:extLst>
+              <a:ext uri="{FF2B5EF4-FFF2-40B4-BE49-F238E27FC236}">
+                <a16:creationId xmlns:a16="http://schemas.microsoft.com/office/drawing/2014/main" id="{3D3B8D98-F11E-764D-AAD3-111F92DC9FC2}"/>
+              </a:ext>
+            </a:extLst>
+          </p:cNvPr>
+          <p:cNvSpPr/>
+          <p:nvPr/>
+        </p:nvSpPr>
+        <p:spPr>
+          <a:xfrm rot="577662" flipH="1">
+            <a:off x="4037231" y="3244128"/>
+            <a:ext cx="1019756" cy="1037853"/>
+          </a:xfrm>
+          <a:prstGeom prst="parallelogram">
+            <a:avLst>
+              <a:gd name="adj" fmla="val 18269"/>
+            </a:avLst>
+          </a:prstGeom>
+          <a:noFill/>
+          <a:ln w="76200">
+            <a:solidFill>
+              <a:srgbClr val="FF0000"/>
+            </a:solidFill>
+          </a:ln>
+        </p:spPr>
+        <p:style>
+          <a:lnRef idx="2">
+            <a:schemeClr val="accent1">
+              <a:shade val="50000"/>
+            </a:schemeClr>
+          </a:lnRef>
+          <a:fillRef idx="1">
+            <a:schemeClr val="accent1"/>
+          </a:fillRef>
+          <a:effectRef idx="0">
+            <a:schemeClr val="accent1"/>
+          </a:effectRef>
+          <a:fontRef idx="minor">
+            <a:schemeClr val="lt1"/>
+          </a:fontRef>
+        </p:style>
+        <p:txBody>
+          <a:bodyPr rtlCol="0" anchor="ctr"/>
+          <a:lstStyle/>
+          <a:p>
+            <a:pPr algn="ctr"/>
+            <a:endParaRPr lang="en-US"/>
+          </a:p>
+        </p:txBody>
+      </p:sp>
+    </p:spTree>
+    <p:extLst>
+      <p:ext uri="{BB962C8B-B14F-4D97-AF65-F5344CB8AC3E}">
+        <p14:creationId xmlns:p14="http://schemas.microsoft.com/office/powerpoint/2010/main" val="115532154"/>
+      </p:ext>
+    </p:extLst>
+  </p:cSld>
+  <p:clrMapOvr>
+    <a:masterClrMapping/>
+  </p:clrMapOvr>
+</p:sld>
+</file>
+
 <file path=ppt/slides/slide2.xml><?xml version="1.0" encoding="utf-8"?>
 <p:sld xmlns:a="http://schemas.openxmlformats.org/drawingml/2006/main" xmlns:r="http://schemas.openxmlformats.org/officeDocument/2006/relationships" xmlns:p="http://schemas.openxmlformats.org/presentationml/2006/main">
   <p:cSld>

</xml_diff>